<commit_message>
adding changes to power point slides
</commit_message>
<xml_diff>
--- a/Credit Card Eligibility- Project 2 (1).pptx
+++ b/Credit Card Eligibility- Project 2 (1).pptx
@@ -3545,7 +3545,7 @@
         </p:nvSpPr>
         <p:spPr>
           <a:xfrm>
-            <a:off x="381300" y="685800"/>
+            <a:off x="381000" y="685800"/>
             <a:ext cx="6096000" cy="3429000"/>
           </a:xfrm>
           <a:custGeom>
@@ -16546,7 +16546,7 @@
             </a:pPr>
             <a:r>
               <a:rPr lang="en"/>
-              <a:t>Approach: Code</a:t>
+              <a:t>Libraries Utilized:</a:t>
             </a:r>
             <a:endParaRPr/>
           </a:p>
@@ -16573,7 +16573,7 @@
         </p:spPr>
         <p:txBody>
           <a:bodyPr spcFirstLastPara="1" wrap="square" lIns="91425" tIns="91425" rIns="91425" bIns="91425" anchor="t" anchorCtr="0">
-            <a:normAutofit lnSpcReduction="10000"/>
+            <a:normAutofit/>
           </a:bodyPr>
           <a:lstStyle/>
           <a:p>
@@ -16588,10 +16588,10 @@
               <a:buChar char="●"/>
             </a:pPr>
             <a:r>
-              <a:rPr lang="en"/>
+              <a:rPr lang="en" dirty="0"/>
               <a:t>Pandas</a:t>
             </a:r>
-            <a:endParaRPr/>
+            <a:endParaRPr dirty="0"/>
           </a:p>
           <a:p>
             <a:pPr marL="457200" lvl="0" indent="-342900" algn="l" rtl="0">
@@ -16605,10 +16605,10 @@
               <a:buChar char="●"/>
             </a:pPr>
             <a:r>
-              <a:rPr lang="en"/>
-              <a:t>Sklearn:	model selection, preprocessing, standard scaler, label encoder, linear model, logistical regression, SVC, Kneighbors, DecisionTree, RandomForest, ensemble,Adaboost, GradientBoost, Metrics, utils</a:t>
-            </a:r>
-            <a:endParaRPr/>
+              <a:rPr lang="en" dirty="0"/>
+              <a:t>Sklearn: model selection, standard scaler, label encoder, linear model, logistical regression, SVC, Kneighbors, DecisionTree, RandomForest, GradientBoost</a:t>
+            </a:r>
+            <a:endParaRPr dirty="0"/>
           </a:p>
           <a:p>
             <a:pPr marL="457200" lvl="0" indent="-342900" algn="l" rtl="0">
@@ -16622,10 +16622,10 @@
               <a:buChar char="●"/>
             </a:pPr>
             <a:r>
-              <a:rPr lang="en"/>
+              <a:rPr lang="en" dirty="0"/>
               <a:t>Numpy</a:t>
             </a:r>
-            <a:endParaRPr/>
+            <a:endParaRPr dirty="0"/>
           </a:p>
           <a:p>
             <a:pPr marL="457200" lvl="0" indent="-342900" algn="l" rtl="0">
@@ -16639,10 +16639,10 @@
               <a:buChar char="●"/>
             </a:pPr>
             <a:r>
-              <a:rPr lang="en"/>
+              <a:rPr lang="en" dirty="0"/>
               <a:t>Seaborn</a:t>
             </a:r>
-            <a:endParaRPr/>
+            <a:endParaRPr dirty="0"/>
           </a:p>
           <a:p>
             <a:pPr marL="457200" lvl="0" indent="-342900" algn="l" rtl="0">
@@ -16656,10 +16656,10 @@
               <a:buChar char="●"/>
             </a:pPr>
             <a:r>
-              <a:rPr lang="en"/>
+              <a:rPr lang="en" dirty="0"/>
               <a:t>Matplotlib</a:t>
             </a:r>
-            <a:endParaRPr/>
+            <a:endParaRPr dirty="0"/>
           </a:p>
           <a:p>
             <a:pPr marL="457200" lvl="0" indent="-342900" algn="l" rtl="0">
@@ -16673,10 +16673,10 @@
               <a:buChar char="●"/>
             </a:pPr>
             <a:r>
-              <a:rPr lang="en"/>
+              <a:rPr lang="en" dirty="0"/>
               <a:t>Scipy.stats</a:t>
             </a:r>
-            <a:endParaRPr/>
+            <a:endParaRPr dirty="0"/>
           </a:p>
           <a:p>
             <a:pPr marL="457200" lvl="0" indent="-342900" algn="l" rtl="0">
@@ -16690,27 +16690,10 @@
               <a:buChar char="●"/>
             </a:pPr>
             <a:r>
-              <a:rPr lang="en"/>
+              <a:rPr lang="en" dirty="0"/>
               <a:t>AutoViz</a:t>
             </a:r>
-            <a:endParaRPr/>
-          </a:p>
-          <a:p>
-            <a:pPr marL="457200" lvl="0" indent="-342900" algn="l" rtl="0">
-              <a:spcBef>
-                <a:spcPts val="0"/>
-              </a:spcBef>
-              <a:spcAft>
-                <a:spcPts val="0"/>
-              </a:spcAft>
-              <a:buSzPts val="1800"/>
-              <a:buChar char="●"/>
-            </a:pPr>
-            <a:r>
-              <a:rPr lang="en"/>
-              <a:t>Label Encoder</a:t>
-            </a:r>
-            <a:endParaRPr/>
+            <a:endParaRPr dirty="0"/>
           </a:p>
         </p:txBody>
       </p:sp>

</xml_diff>